<commit_message>
minor updates in topics
</commit_message>
<xml_diff>
--- a/01 Java Intro/Java Slides part 1.pptx
+++ b/01 Java Intro/Java Slides part 1.pptx
@@ -288,7 +288,7 @@
           <a:p>
             <a:fld id="{AF869721-F543-4A6C-BF9D-65D7CC540427}" type="datetimeFigureOut">
               <a:rPr lang="en-US" smtClean="0"/>
-              <a:t>8/20/2024</a:t>
+              <a:t>9/10/2024</a:t>
             </a:fld>
             <a:endParaRPr lang="en-US" dirty="0"/>
           </a:p>
@@ -465,7 +465,7 @@
           <a:p>
             <a:fld id="{C732326A-4C88-4AFB-AA5B-5919D81DFF5B}" type="datetimeFigureOut">
               <a:rPr lang="en-US" smtClean="0"/>
-              <a:t>8/20/2024</a:t>
+              <a:t>9/10/2024</a:t>
             </a:fld>
             <a:endParaRPr lang="en-US" dirty="0"/>
           </a:p>
@@ -1146,7 +1146,7 @@
             <a:fld id="{B61BEF0D-F0BB-DE4B-95CE-6DB70DBA9567}" type="datetimeFigureOut">
               <a:rPr lang="en-US" smtClean="0"/>
               <a:pPr/>
-              <a:t>8/20/2024</a:t>
+              <a:t>9/10/2024</a:t>
             </a:fld>
             <a:endParaRPr lang="en-US" dirty="0"/>
           </a:p>
@@ -1410,7 +1410,7 @@
             <a:fld id="{B61BEF0D-F0BB-DE4B-95CE-6DB70DBA9567}" type="datetimeFigureOut">
               <a:rPr lang="en-US" smtClean="0"/>
               <a:pPr/>
-              <a:t>8/20/2024</a:t>
+              <a:t>9/10/2024</a:t>
             </a:fld>
             <a:endParaRPr lang="en-US" dirty="0"/>
           </a:p>
@@ -1647,7 +1647,7 @@
             <a:fld id="{B61BEF0D-F0BB-DE4B-95CE-6DB70DBA9567}" type="datetimeFigureOut">
               <a:rPr lang="en-US" smtClean="0"/>
               <a:pPr/>
-              <a:t>8/20/2024</a:t>
+              <a:t>9/10/2024</a:t>
             </a:fld>
             <a:endParaRPr lang="en-US" dirty="0"/>
           </a:p>
@@ -1889,7 +1889,7 @@
             <a:fld id="{B61BEF0D-F0BB-DE4B-95CE-6DB70DBA9567}" type="datetimeFigureOut">
               <a:rPr lang="en-US" smtClean="0"/>
               <a:pPr/>
-              <a:t>8/20/2024</a:t>
+              <a:t>9/10/2024</a:t>
             </a:fld>
             <a:endParaRPr lang="en-US" dirty="0"/>
           </a:p>
@@ -2198,7 +2198,7 @@
             <a:fld id="{B61BEF0D-F0BB-DE4B-95CE-6DB70DBA9567}" type="datetimeFigureOut">
               <a:rPr lang="en-US" smtClean="0"/>
               <a:pPr/>
-              <a:t>8/20/2024</a:t>
+              <a:t>9/10/2024</a:t>
             </a:fld>
             <a:endParaRPr lang="en-US" dirty="0"/>
           </a:p>
@@ -2502,7 +2502,7 @@
             <a:fld id="{B61BEF0D-F0BB-DE4B-95CE-6DB70DBA9567}" type="datetimeFigureOut">
               <a:rPr lang="en-US" smtClean="0"/>
               <a:pPr/>
-              <a:t>8/20/2024</a:t>
+              <a:t>9/10/2024</a:t>
             </a:fld>
             <a:endParaRPr lang="en-US" dirty="0"/>
           </a:p>
@@ -2926,7 +2926,7 @@
             <a:fld id="{B61BEF0D-F0BB-DE4B-95CE-6DB70DBA9567}" type="datetimeFigureOut">
               <a:rPr lang="en-US" smtClean="0"/>
               <a:pPr/>
-              <a:t>8/20/2024</a:t>
+              <a:t>9/10/2024</a:t>
             </a:fld>
             <a:endParaRPr lang="en-US" dirty="0"/>
           </a:p>
@@ -3023,7 +3023,7 @@
             <a:fld id="{B61BEF0D-F0BB-DE4B-95CE-6DB70DBA9567}" type="datetimeFigureOut">
               <a:rPr lang="en-US" smtClean="0"/>
               <a:pPr/>
-              <a:t>8/20/2024</a:t>
+              <a:t>9/10/2024</a:t>
             </a:fld>
             <a:endParaRPr lang="en-US" dirty="0"/>
           </a:p>
@@ -3187,7 +3187,7 @@
             <a:fld id="{B61BEF0D-F0BB-DE4B-95CE-6DB70DBA9567}" type="datetimeFigureOut">
               <a:rPr lang="en-US" smtClean="0"/>
               <a:pPr/>
-              <a:t>8/20/2024</a:t>
+              <a:t>9/10/2024</a:t>
             </a:fld>
             <a:endParaRPr lang="en-US" dirty="0"/>
           </a:p>
@@ -3567,7 +3567,7 @@
             <a:fld id="{B61BEF0D-F0BB-DE4B-95CE-6DB70DBA9567}" type="datetimeFigureOut">
               <a:rPr lang="en-US" smtClean="0"/>
               <a:pPr/>
-              <a:t>8/20/2024</a:t>
+              <a:t>9/10/2024</a:t>
             </a:fld>
             <a:endParaRPr lang="en-US" dirty="0"/>
           </a:p>
@@ -3857,7 +3857,7 @@
             <a:fld id="{B61BEF0D-F0BB-DE4B-95CE-6DB70DBA9567}" type="datetimeFigureOut">
               <a:rPr lang="en-US" smtClean="0"/>
               <a:pPr/>
-              <a:t>8/20/2024</a:t>
+              <a:t>9/10/2024</a:t>
             </a:fld>
             <a:endParaRPr lang="en-US" dirty="0"/>
           </a:p>
@@ -4070,7 +4070,7 @@
             <a:fld id="{B61BEF0D-F0BB-DE4B-95CE-6DB70DBA9567}" type="datetimeFigureOut">
               <a:rPr lang="en-US" smtClean="0"/>
               <a:pPr/>
-              <a:t>8/20/2024</a:t>
+              <a:t>9/10/2024</a:t>
             </a:fld>
             <a:endParaRPr lang="en-US" dirty="0"/>
           </a:p>
@@ -13977,10 +13977,15 @@
             <p:ph idx="1"/>
           </p:nvPr>
         </p:nvSpPr>
-        <p:spPr/>
+        <p:spPr>
+          <a:xfrm>
+            <a:off x="581192" y="2180496"/>
+            <a:ext cx="11029615" cy="3975348"/>
+          </a:xfrm>
+        </p:spPr>
         <p:txBody>
           <a:bodyPr>
-            <a:normAutofit fontScale="92500" lnSpcReduction="10000"/>
+            <a:normAutofit fontScale="92500" lnSpcReduction="20000"/>
           </a:bodyPr>
           <a:lstStyle/>
           <a:p>
@@ -14066,8 +14071,33 @@
             </a:pPr>
             <a:r>
               <a:rPr lang="en-US" dirty="0"/>
-              <a:t>Games, etc.</a:t>
-            </a:r>
+              <a:t>Games</a:t>
+            </a:r>
+          </a:p>
+          <a:p>
+            <a:pPr marL="514350" indent="-514350">
+              <a:buFont typeface="+mj-lt"/>
+              <a:buAutoNum type="arabicPeriod"/>
+            </a:pPr>
+            <a:r>
+              <a:rPr lang="en-US" dirty="0"/>
+              <a:t>Testing</a:t>
+            </a:r>
+          </a:p>
+          <a:p>
+            <a:pPr marL="514350" indent="-514350">
+              <a:buFont typeface="+mj-lt"/>
+              <a:buAutoNum type="arabicPeriod"/>
+            </a:pPr>
+            <a:r>
+              <a:rPr lang="en-US" dirty="0"/>
+              <a:t>Big data </a:t>
+            </a:r>
+            <a:r>
+              <a:rPr lang="en-US" dirty="0" err="1"/>
+              <a:t>etc</a:t>
+            </a:r>
+            <a:endParaRPr lang="en-US" dirty="0"/>
           </a:p>
         </p:txBody>
       </p:sp>
@@ -30130,6 +30160,68 @@
           </a:prstGeom>
         </p:spPr>
       </p:pic>
+      <p:sp>
+        <p:nvSpPr>
+          <p:cNvPr id="2" name="Rectangle 1">
+            <a:extLst>
+              <a:ext uri="{FF2B5EF4-FFF2-40B4-BE49-F238E27FC236}">
+                <a16:creationId xmlns:a16="http://schemas.microsoft.com/office/drawing/2014/main" id="{4A245F98-B26E-8014-A5B0-7E916A313981}"/>
+              </a:ext>
+            </a:extLst>
+          </p:cNvPr>
+          <p:cNvSpPr/>
+          <p:nvPr/>
+        </p:nvSpPr>
+        <p:spPr>
+          <a:xfrm>
+            <a:off x="7618190" y="4793672"/>
+            <a:ext cx="886691" cy="387927"/>
+          </a:xfrm>
+          <a:prstGeom prst="rect">
+            <a:avLst/>
+          </a:prstGeom>
+          <a:noFill/>
+          <a:ln>
+            <a:noFill/>
+          </a:ln>
+        </p:spPr>
+        <p:style>
+          <a:lnRef idx="2">
+            <a:schemeClr val="accent1">
+              <a:shade val="15000"/>
+            </a:schemeClr>
+          </a:lnRef>
+          <a:fillRef idx="1">
+            <a:schemeClr val="accent1"/>
+          </a:fillRef>
+          <a:effectRef idx="0">
+            <a:schemeClr val="accent1"/>
+          </a:effectRef>
+          <a:fontRef idx="minor">
+            <a:schemeClr val="lt1"/>
+          </a:fontRef>
+        </p:style>
+        <p:txBody>
+          <a:bodyPr rtlCol="0" anchor="ctr"/>
+          <a:lstStyle/>
+          <a:p>
+            <a:pPr algn="ctr"/>
+            <a:r>
+              <a:rPr lang="en-US" dirty="0">
+                <a:solidFill>
+                  <a:schemeClr val="tx1"/>
+                </a:solidFill>
+              </a:rPr>
+              <a:t>JRE</a:t>
+            </a:r>
+            <a:endParaRPr lang="en-IN" dirty="0">
+              <a:solidFill>
+                <a:schemeClr val="tx1"/>
+              </a:solidFill>
+            </a:endParaRPr>
+          </a:p>
+        </p:txBody>
+      </p:sp>
     </p:spTree>
     <p:extLst>
       <p:ext uri="{BB962C8B-B14F-4D97-AF65-F5344CB8AC3E}">

</xml_diff>